<commit_message>
add fileA_x to featureX branch
</commit_message>
<xml_diff>
--- a/notes.pptx
+++ b/notes.pptx
@@ -12,6 +12,9 @@
     <p:sldId id="260" r:id="rId6"/>
     <p:sldId id="261" r:id="rId7"/>
     <p:sldId id="262" r:id="rId8"/>
+    <p:sldId id="263" r:id="rId9"/>
+    <p:sldId id="264" r:id="rId10"/>
+    <p:sldId id="265" r:id="rId11"/>
   </p:sldIdLst>
   <p:sldSz cx="12192000" cy="6858000"/>
   <p:notesSz cx="6858000" cy="9144000"/>
@@ -265,7 +268,7 @@
           <a:p>
             <a:fld id="{90E55011-94C0-4F0C-904A-E6E29A81D827}" type="datetimeFigureOut">
               <a:rPr lang="en-US" smtClean="0"/>
-              <a:t>9/6/2021</a:t>
+              <a:t>9/12/2021</a:t>
             </a:fld>
             <a:endParaRPr lang="en-US"/>
           </a:p>
@@ -463,7 +466,7 @@
           <a:p>
             <a:fld id="{90E55011-94C0-4F0C-904A-E6E29A81D827}" type="datetimeFigureOut">
               <a:rPr lang="en-US" smtClean="0"/>
-              <a:t>9/6/2021</a:t>
+              <a:t>9/12/2021</a:t>
             </a:fld>
             <a:endParaRPr lang="en-US"/>
           </a:p>
@@ -671,7 +674,7 @@
           <a:p>
             <a:fld id="{90E55011-94C0-4F0C-904A-E6E29A81D827}" type="datetimeFigureOut">
               <a:rPr lang="en-US" smtClean="0"/>
-              <a:t>9/6/2021</a:t>
+              <a:t>9/12/2021</a:t>
             </a:fld>
             <a:endParaRPr lang="en-US"/>
           </a:p>
@@ -869,7 +872,7 @@
           <a:p>
             <a:fld id="{90E55011-94C0-4F0C-904A-E6E29A81D827}" type="datetimeFigureOut">
               <a:rPr lang="en-US" smtClean="0"/>
-              <a:t>9/6/2021</a:t>
+              <a:t>9/12/2021</a:t>
             </a:fld>
             <a:endParaRPr lang="en-US"/>
           </a:p>
@@ -1144,7 +1147,7 @@
           <a:p>
             <a:fld id="{90E55011-94C0-4F0C-904A-E6E29A81D827}" type="datetimeFigureOut">
               <a:rPr lang="en-US" smtClean="0"/>
-              <a:t>9/6/2021</a:t>
+              <a:t>9/12/2021</a:t>
             </a:fld>
             <a:endParaRPr lang="en-US"/>
           </a:p>
@@ -1409,7 +1412,7 @@
           <a:p>
             <a:fld id="{90E55011-94C0-4F0C-904A-E6E29A81D827}" type="datetimeFigureOut">
               <a:rPr lang="en-US" smtClean="0"/>
-              <a:t>9/6/2021</a:t>
+              <a:t>9/12/2021</a:t>
             </a:fld>
             <a:endParaRPr lang="en-US"/>
           </a:p>
@@ -1821,7 +1824,7 @@
           <a:p>
             <a:fld id="{90E55011-94C0-4F0C-904A-E6E29A81D827}" type="datetimeFigureOut">
               <a:rPr lang="en-US" smtClean="0"/>
-              <a:t>9/6/2021</a:t>
+              <a:t>9/12/2021</a:t>
             </a:fld>
             <a:endParaRPr lang="en-US"/>
           </a:p>
@@ -1962,7 +1965,7 @@
           <a:p>
             <a:fld id="{90E55011-94C0-4F0C-904A-E6E29A81D827}" type="datetimeFigureOut">
               <a:rPr lang="en-US" smtClean="0"/>
-              <a:t>9/6/2021</a:t>
+              <a:t>9/12/2021</a:t>
             </a:fld>
             <a:endParaRPr lang="en-US"/>
           </a:p>
@@ -2075,7 +2078,7 @@
           <a:p>
             <a:fld id="{90E55011-94C0-4F0C-904A-E6E29A81D827}" type="datetimeFigureOut">
               <a:rPr lang="en-US" smtClean="0"/>
-              <a:t>9/6/2021</a:t>
+              <a:t>9/12/2021</a:t>
             </a:fld>
             <a:endParaRPr lang="en-US"/>
           </a:p>
@@ -2386,7 +2389,7 @@
           <a:p>
             <a:fld id="{90E55011-94C0-4F0C-904A-E6E29A81D827}" type="datetimeFigureOut">
               <a:rPr lang="en-US" smtClean="0"/>
-              <a:t>9/6/2021</a:t>
+              <a:t>9/12/2021</a:t>
             </a:fld>
             <a:endParaRPr lang="en-US"/>
           </a:p>
@@ -2674,7 +2677,7 @@
           <a:p>
             <a:fld id="{90E55011-94C0-4F0C-904A-E6E29A81D827}" type="datetimeFigureOut">
               <a:rPr lang="en-US" smtClean="0"/>
-              <a:t>9/6/2021</a:t>
+              <a:t>9/12/2021</a:t>
             </a:fld>
             <a:endParaRPr lang="en-US"/>
           </a:p>
@@ -2915,7 +2918,7 @@
           <a:p>
             <a:fld id="{90E55011-94C0-4F0C-904A-E6E29A81D827}" type="datetimeFigureOut">
               <a:rPr lang="en-US" smtClean="0"/>
-              <a:t>9/6/2021</a:t>
+              <a:t>9/12/2021</a:t>
             </a:fld>
             <a:endParaRPr lang="en-US"/>
           </a:p>
@@ -3395,6 +3398,66 @@
 </p:sld>
 </file>
 
+<file path=ppt/slides/slide10.xml><?xml version="1.0" encoding="utf-8"?>
+<p:sld xmlns:a="http://schemas.openxmlformats.org/drawingml/2006/main" xmlns:r="http://schemas.openxmlformats.org/officeDocument/2006/relationships" xmlns:p="http://schemas.openxmlformats.org/presentationml/2006/main">
+  <p:cSld>
+    <p:spTree>
+      <p:nvGrpSpPr>
+        <p:cNvPr id="1" name=""/>
+        <p:cNvGrpSpPr/>
+        <p:nvPr/>
+      </p:nvGrpSpPr>
+      <p:grpSpPr>
+        <a:xfrm>
+          <a:off x="0" y="0"/>
+          <a:ext cx="0" cy="0"/>
+          <a:chOff x="0" y="0"/>
+          <a:chExt cx="0" cy="0"/>
+        </a:xfrm>
+      </p:grpSpPr>
+      <p:pic>
+        <p:nvPicPr>
+          <p:cNvPr id="3" name="Picture 2">
+            <a:extLst>
+              <a:ext uri="{FF2B5EF4-FFF2-40B4-BE49-F238E27FC236}">
+                <a16:creationId xmlns:a16="http://schemas.microsoft.com/office/drawing/2014/main" id="{801E978F-87D6-4042-B5A1-99007A57434F}"/>
+              </a:ext>
+            </a:extLst>
+          </p:cNvPr>
+          <p:cNvPicPr>
+            <a:picLocks noChangeAspect="1"/>
+          </p:cNvPicPr>
+          <p:nvPr/>
+        </p:nvPicPr>
+        <p:blipFill>
+          <a:blip r:embed="rId2"/>
+          <a:stretch>
+            <a:fillRect/>
+          </a:stretch>
+        </p:blipFill>
+        <p:spPr>
+          <a:xfrm>
+            <a:off x="0" y="10910"/>
+            <a:ext cx="12192000" cy="6836179"/>
+          </a:xfrm>
+          <a:prstGeom prst="rect">
+            <a:avLst/>
+          </a:prstGeom>
+        </p:spPr>
+      </p:pic>
+    </p:spTree>
+    <p:extLst>
+      <p:ext uri="{BB962C8B-B14F-4D97-AF65-F5344CB8AC3E}">
+        <p14:creationId xmlns:p14="http://schemas.microsoft.com/office/powerpoint/2010/main" val="2634076509"/>
+      </p:ext>
+    </p:extLst>
+  </p:cSld>
+  <p:clrMapOvr>
+    <a:masterClrMapping/>
+  </p:clrMapOvr>
+</p:sld>
+</file>
+
 <file path=ppt/slides/slide2.xml><?xml version="1.0" encoding="utf-8"?>
 <p:sld xmlns:a="http://schemas.openxmlformats.org/drawingml/2006/main" xmlns:r="http://schemas.openxmlformats.org/officeDocument/2006/relationships" xmlns:p="http://schemas.openxmlformats.org/presentationml/2006/main">
   <p:cSld>
@@ -3820,6 +3883,126 @@
     <p:extLst>
       <p:ext uri="{BB962C8B-B14F-4D97-AF65-F5344CB8AC3E}">
         <p14:creationId xmlns:p14="http://schemas.microsoft.com/office/powerpoint/2010/main" val="2472294464"/>
+      </p:ext>
+    </p:extLst>
+  </p:cSld>
+  <p:clrMapOvr>
+    <a:masterClrMapping/>
+  </p:clrMapOvr>
+</p:sld>
+</file>
+
+<file path=ppt/slides/slide8.xml><?xml version="1.0" encoding="utf-8"?>
+<p:sld xmlns:a="http://schemas.openxmlformats.org/drawingml/2006/main" xmlns:r="http://schemas.openxmlformats.org/officeDocument/2006/relationships" xmlns:p="http://schemas.openxmlformats.org/presentationml/2006/main">
+  <p:cSld>
+    <p:spTree>
+      <p:nvGrpSpPr>
+        <p:cNvPr id="1" name=""/>
+        <p:cNvGrpSpPr/>
+        <p:nvPr/>
+      </p:nvGrpSpPr>
+      <p:grpSpPr>
+        <a:xfrm>
+          <a:off x="0" y="0"/>
+          <a:ext cx="0" cy="0"/>
+          <a:chOff x="0" y="0"/>
+          <a:chExt cx="0" cy="0"/>
+        </a:xfrm>
+      </p:grpSpPr>
+      <p:pic>
+        <p:nvPicPr>
+          <p:cNvPr id="3" name="Picture 2">
+            <a:extLst>
+              <a:ext uri="{FF2B5EF4-FFF2-40B4-BE49-F238E27FC236}">
+                <a16:creationId xmlns:a16="http://schemas.microsoft.com/office/drawing/2014/main" id="{FBF732DC-FE57-48A6-9533-68A47D663C63}"/>
+              </a:ext>
+            </a:extLst>
+          </p:cNvPr>
+          <p:cNvPicPr>
+            <a:picLocks noChangeAspect="1"/>
+          </p:cNvPicPr>
+          <p:nvPr/>
+        </p:nvPicPr>
+        <p:blipFill>
+          <a:blip r:embed="rId2"/>
+          <a:stretch>
+            <a:fillRect/>
+          </a:stretch>
+        </p:blipFill>
+        <p:spPr>
+          <a:xfrm>
+            <a:off x="314037" y="270253"/>
+            <a:ext cx="11286836" cy="6317493"/>
+          </a:xfrm>
+          <a:prstGeom prst="rect">
+            <a:avLst/>
+          </a:prstGeom>
+        </p:spPr>
+      </p:pic>
+    </p:spTree>
+    <p:extLst>
+      <p:ext uri="{BB962C8B-B14F-4D97-AF65-F5344CB8AC3E}">
+        <p14:creationId xmlns:p14="http://schemas.microsoft.com/office/powerpoint/2010/main" val="4133911834"/>
+      </p:ext>
+    </p:extLst>
+  </p:cSld>
+  <p:clrMapOvr>
+    <a:masterClrMapping/>
+  </p:clrMapOvr>
+</p:sld>
+</file>
+
+<file path=ppt/slides/slide9.xml><?xml version="1.0" encoding="utf-8"?>
+<p:sld xmlns:a="http://schemas.openxmlformats.org/drawingml/2006/main" xmlns:r="http://schemas.openxmlformats.org/officeDocument/2006/relationships" xmlns:p="http://schemas.openxmlformats.org/presentationml/2006/main">
+  <p:cSld>
+    <p:spTree>
+      <p:nvGrpSpPr>
+        <p:cNvPr id="1" name=""/>
+        <p:cNvGrpSpPr/>
+        <p:nvPr/>
+      </p:nvGrpSpPr>
+      <p:grpSpPr>
+        <a:xfrm>
+          <a:off x="0" y="0"/>
+          <a:ext cx="0" cy="0"/>
+          <a:chOff x="0" y="0"/>
+          <a:chExt cx="0" cy="0"/>
+        </a:xfrm>
+      </p:grpSpPr>
+      <p:pic>
+        <p:nvPicPr>
+          <p:cNvPr id="3" name="Picture 2">
+            <a:extLst>
+              <a:ext uri="{FF2B5EF4-FFF2-40B4-BE49-F238E27FC236}">
+                <a16:creationId xmlns:a16="http://schemas.microsoft.com/office/drawing/2014/main" id="{21D6F758-2C67-44AA-BC3B-FF93B514BD92}"/>
+              </a:ext>
+            </a:extLst>
+          </p:cNvPr>
+          <p:cNvPicPr>
+            <a:picLocks noChangeAspect="1"/>
+          </p:cNvPicPr>
+          <p:nvPr/>
+        </p:nvPicPr>
+        <p:blipFill>
+          <a:blip r:embed="rId2"/>
+          <a:stretch>
+            <a:fillRect/>
+          </a:stretch>
+        </p:blipFill>
+        <p:spPr>
+          <a:xfrm>
+            <a:off x="129960" y="0"/>
+            <a:ext cx="11932079" cy="6858000"/>
+          </a:xfrm>
+          <a:prstGeom prst="rect">
+            <a:avLst/>
+          </a:prstGeom>
+        </p:spPr>
+      </p:pic>
+    </p:spTree>
+    <p:extLst>
+      <p:ext uri="{BB962C8B-B14F-4D97-AF65-F5344CB8AC3E}">
+        <p14:creationId xmlns:p14="http://schemas.microsoft.com/office/powerpoint/2010/main" val="1721161302"/>
       </p:ext>
     </p:extLst>
   </p:cSld>

</xml_diff>